<commit_message>
1. Imagens para apresentação
1.
2.
3.
</commit_message>
<xml_diff>
--- a/MVP/MVP-final/Apresentação Final.pptx
+++ b/MVP/MVP-final/Apresentação Final.pptx
@@ -17,9 +17,9 @@
     <p:sldId id="275" r:id="rId8"/>
     <p:sldId id="277" r:id="rId9"/>
     <p:sldId id="276" r:id="rId10"/>
-    <p:sldId id="278" r:id="rId11"/>
+    <p:sldId id="285" r:id="rId11"/>
     <p:sldId id="279" r:id="rId12"/>
-    <p:sldId id="280" r:id="rId13"/>
+    <p:sldId id="284" r:id="rId13"/>
     <p:sldId id="281" r:id="rId14"/>
     <p:sldId id="282" r:id="rId15"/>
     <p:sldId id="283" r:id="rId16"/>
@@ -135,9 +135,9 @@
             <p14:sldId id="275"/>
             <p14:sldId id="277"/>
             <p14:sldId id="276"/>
-            <p14:sldId id="278"/>
+            <p14:sldId id="285"/>
             <p14:sldId id="279"/>
-            <p14:sldId id="280"/>
+            <p14:sldId id="284"/>
             <p14:sldId id="281"/>
             <p14:sldId id="282"/>
             <p14:sldId id="283"/>
@@ -240,7 +240,7 @@
           <a:p>
             <a:fld id="{BAC0F208-0698-41B8-BDE8-AE6BC3AEB68A}" type="datetimeFigureOut">
               <a:rPr lang="pt-BR" smtClean="0"/>
-              <a:t>17/07/2018</a:t>
+              <a:t>20/07/2018</a:t>
             </a:fld>
             <a:endParaRPr lang="pt-BR"/>
           </a:p>
@@ -551,7 +551,71 @@
           <a:bodyPr/>
           <a:lstStyle/>
           <a:p>
-            <a:endParaRPr lang="en-US"/>
+            <a:r>
+              <a:rPr lang="pt-BR" dirty="0"/>
+              <a:t>Nessa apresentação você deve ter em mente:</a:t>
+            </a:r>
+          </a:p>
+          <a:p>
+            <a:endParaRPr lang="pt-BR" dirty="0"/>
+          </a:p>
+          <a:p>
+            <a:pPr marL="171450" indent="-171450">
+              <a:buFont typeface="Arial" panose="020B0604020202020204" pitchFamily="34" charset="0"/>
+              <a:buChar char="•"/>
+            </a:pPr>
+            <a:r>
+              <a:rPr lang="pt-BR" dirty="0"/>
+              <a:t>Como fazer essas pessoas aprenderem algo novo hoje?</a:t>
+            </a:r>
+          </a:p>
+          <a:p>
+            <a:pPr marL="171450" indent="-171450">
+              <a:buFont typeface="Arial" panose="020B0604020202020204" pitchFamily="34" charset="0"/>
+              <a:buChar char="•"/>
+            </a:pPr>
+            <a:endParaRPr lang="pt-BR" dirty="0"/>
+          </a:p>
+          <a:p>
+            <a:pPr marL="171450" indent="-171450">
+              <a:buFont typeface="Arial" panose="020B0604020202020204" pitchFamily="34" charset="0"/>
+              <a:buChar char="•"/>
+            </a:pPr>
+            <a:r>
+              <a:rPr lang="pt-BR" dirty="0"/>
+              <a:t>O projeto é bem conhecido, mas sempre há algo a agregar.</a:t>
+            </a:r>
+          </a:p>
+          <a:p>
+            <a:pPr marL="171450" indent="-171450">
+              <a:buFont typeface="Arial" panose="020B0604020202020204" pitchFamily="34" charset="0"/>
+              <a:buChar char="•"/>
+            </a:pPr>
+            <a:endParaRPr lang="pt-BR" dirty="0"/>
+          </a:p>
+          <a:p>
+            <a:pPr marL="171450" indent="-171450">
+              <a:buFont typeface="Arial" panose="020B0604020202020204" pitchFamily="34" charset="0"/>
+              <a:buChar char="•"/>
+            </a:pPr>
+            <a:r>
+              <a:rPr lang="pt-BR" dirty="0"/>
+              <a:t>Se eles pudessem lembrar de uma única coisa do que eu mostrar hoje, o que eu gostaria que fosse?</a:t>
+            </a:r>
+          </a:p>
+          <a:p>
+            <a:pPr marL="171450" indent="-171450">
+              <a:buFont typeface="Arial" panose="020B0604020202020204" pitchFamily="34" charset="0"/>
+              <a:buChar char="•"/>
+            </a:pPr>
+            <a:endParaRPr lang="pt-BR" dirty="0"/>
+          </a:p>
+          <a:p>
+            <a:pPr marL="0" indent="0">
+              <a:buFont typeface="Arial" panose="020B0604020202020204" pitchFamily="34" charset="0"/>
+              <a:buNone/>
+            </a:pPr>
+            <a:endParaRPr lang="en-US" dirty="0"/>
           </a:p>
         </p:txBody>
       </p:sp>
@@ -637,7 +701,74 @@
           <a:p>
             <a:r>
               <a:rPr lang="pt-BR" dirty="0"/>
-              <a:t>6. COMMITING</a:t>
+              <a:t>6</a:t>
+            </a:r>
+            <a:r>
+              <a:rPr lang="pt-BR"/>
+              <a:t>. COMMITING</a:t>
+            </a:r>
+          </a:p>
+          <a:p>
+            <a:endParaRPr lang="pt-BR"/>
+          </a:p>
+          <a:p>
+            <a:r>
+              <a:rPr lang="pt-BR"/>
+              <a:t>Mudar o Formato do Slide.</a:t>
+            </a:r>
+          </a:p>
+          <a:p>
+            <a:endParaRPr lang="pt-BR"/>
+          </a:p>
+          <a:p>
+            <a:r>
+              <a:rPr lang="pt-BR"/>
+              <a:t>Troque “Demo” por “Demonstração”</a:t>
+            </a:r>
+          </a:p>
+          <a:p>
+            <a:endParaRPr lang="pt-BR"/>
+          </a:p>
+          <a:p>
+            <a:r>
+              <a:rPr lang="pt-BR"/>
+              <a:t>Por que essa demonstração apareceu agora? O que você quer provar/ discutir/ convencer com ela?</a:t>
+            </a:r>
+          </a:p>
+          <a:p>
+            <a:endParaRPr lang="pt-BR"/>
+          </a:p>
+          <a:p>
+            <a:r>
+              <a:rPr lang="pt-BR"/>
+              <a:t>Resuma em uma frase e coloque como subtítulo. </a:t>
+            </a:r>
+          </a:p>
+          <a:p>
+            <a:endParaRPr lang="pt-BR"/>
+          </a:p>
+          <a:p>
+            <a:r>
+              <a:rPr lang="pt-BR"/>
+              <a:t>A quem interessa essa Demonstracao? Pq? </a:t>
+            </a:r>
+          </a:p>
+          <a:p>
+            <a:endParaRPr lang="pt-BR"/>
+          </a:p>
+          <a:p>
+            <a:r>
+              <a:rPr lang="pt-BR"/>
+              <a:t>Use a resposta para se posicionar durante a demonstracao e explora-la o máximo possível </a:t>
+            </a:r>
+          </a:p>
+          <a:p>
+            <a:endParaRPr lang="pt-BR"/>
+          </a:p>
+          <a:p>
+            <a:r>
+              <a:rPr lang="pt-BR"/>
+              <a:t>TREINE, TREINE E TREINE</a:t>
             </a:r>
             <a:endParaRPr lang="en-US" dirty="0"/>
           </a:p>
@@ -669,7 +800,7 @@
     </p:spTree>
     <p:extLst>
       <p:ext uri="{BB962C8B-B14F-4D97-AF65-F5344CB8AC3E}">
-        <p14:creationId xmlns:p14="http://schemas.microsoft.com/office/powerpoint/2010/main" val="2619784622"/>
+        <p14:creationId xmlns:p14="http://schemas.microsoft.com/office/powerpoint/2010/main" val="1894687094"/>
       </p:ext>
     </p:extLst>
   </p:cSld>
@@ -725,7 +856,20 @@
           <a:p>
             <a:r>
               <a:rPr lang="pt-BR" dirty="0"/>
-              <a:t>6. COMMITING</a:t>
+              <a:t>6</a:t>
+            </a:r>
+            <a:r>
+              <a:rPr lang="pt-BR"/>
+              <a:t>. COMMITING</a:t>
+            </a:r>
+          </a:p>
+          <a:p>
+            <a:endParaRPr lang="pt-BR"/>
+          </a:p>
+          <a:p>
+            <a:r>
+              <a:rPr lang="pt-BR"/>
+              <a:t>Explicar brevemente e em uma visao bem alto nível</a:t>
             </a:r>
             <a:endParaRPr lang="en-US" dirty="0"/>
           </a:p>
@@ -813,7 +957,74 @@
           <a:p>
             <a:r>
               <a:rPr lang="pt-BR" dirty="0"/>
-              <a:t>6. COMMITING</a:t>
+              <a:t>6</a:t>
+            </a:r>
+            <a:r>
+              <a:rPr lang="pt-BR"/>
+              <a:t>. COMMITING</a:t>
+            </a:r>
+          </a:p>
+          <a:p>
+            <a:endParaRPr lang="pt-BR"/>
+          </a:p>
+          <a:p>
+            <a:r>
+              <a:rPr lang="pt-BR"/>
+              <a:t>Mudar o Formato do Slide.</a:t>
+            </a:r>
+          </a:p>
+          <a:p>
+            <a:endParaRPr lang="pt-BR"/>
+          </a:p>
+          <a:p>
+            <a:r>
+              <a:rPr lang="pt-BR"/>
+              <a:t>Troque “Demo” por “Demonstração”</a:t>
+            </a:r>
+          </a:p>
+          <a:p>
+            <a:endParaRPr lang="pt-BR"/>
+          </a:p>
+          <a:p>
+            <a:r>
+              <a:rPr lang="pt-BR"/>
+              <a:t>Por que essa demonstração apareceu agora? O que você quer provar/ discutir/ convencer com ela?</a:t>
+            </a:r>
+          </a:p>
+          <a:p>
+            <a:endParaRPr lang="pt-BR"/>
+          </a:p>
+          <a:p>
+            <a:r>
+              <a:rPr lang="pt-BR"/>
+              <a:t>Resuma em uma frase e coloque como subtítulo. </a:t>
+            </a:r>
+          </a:p>
+          <a:p>
+            <a:endParaRPr lang="pt-BR"/>
+          </a:p>
+          <a:p>
+            <a:r>
+              <a:rPr lang="pt-BR"/>
+              <a:t>A quem interessa essa Demonstracao? Pq? </a:t>
+            </a:r>
+          </a:p>
+          <a:p>
+            <a:endParaRPr lang="pt-BR"/>
+          </a:p>
+          <a:p>
+            <a:r>
+              <a:rPr lang="pt-BR"/>
+              <a:t>Use a resposta para se posicionar durante a demonstracao e explora-la o máximo possível </a:t>
+            </a:r>
+          </a:p>
+          <a:p>
+            <a:endParaRPr lang="pt-BR"/>
+          </a:p>
+          <a:p>
+            <a:r>
+              <a:rPr lang="pt-BR"/>
+              <a:t>TREINE, TREINE E TREINE</a:t>
             </a:r>
             <a:endParaRPr lang="en-US" dirty="0"/>
           </a:p>
@@ -899,9 +1110,12 @@
           <a:bodyPr/>
           <a:lstStyle/>
           <a:p>
+            <a:pPr marL="228600" indent="-228600">
+              <a:buAutoNum type="arabicPeriod"/>
+            </a:pPr>
             <a:r>
               <a:rPr lang="pt-BR" dirty="0"/>
-              <a:t>1. ENGAGING (</a:t>
+              <a:t>ENGAGING (</a:t>
             </a:r>
             <a:r>
               <a:rPr lang="pt-BR" dirty="0" err="1"/>
@@ -910,6 +1124,95 @@
             <a:r>
               <a:rPr lang="pt-BR" dirty="0"/>
               <a:t>)</a:t>
+            </a:r>
+          </a:p>
+          <a:p>
+            <a:pPr marL="228600" indent="-228600">
+              <a:buAutoNum type="arabicPeriod"/>
+            </a:pPr>
+            <a:endParaRPr lang="pt-BR" dirty="0"/>
+          </a:p>
+          <a:p>
+            <a:pPr marL="228600" indent="-228600">
+              <a:buAutoNum type="arabicPeriod"/>
+            </a:pPr>
+            <a:r>
+              <a:rPr lang="pt-BR" dirty="0" err="1"/>
+              <a:t>Automavao.completa</a:t>
+            </a:r>
+            <a:r>
+              <a:rPr lang="pt-BR" dirty="0"/>
+              <a:t> do teste.com o </a:t>
+            </a:r>
+            <a:r>
+              <a:rPr lang="pt-BR" dirty="0" err="1"/>
+              <a:t>TestStand</a:t>
+            </a:r>
+            <a:r>
+              <a:rPr lang="pt-BR" dirty="0"/>
+              <a:t>...uniformidade dos passos de teste e coleta de resultados. Testes em paralelo</a:t>
+            </a:r>
+          </a:p>
+          <a:p>
+            <a:pPr marL="228600" indent="-228600">
+              <a:buAutoNum type="arabicPeriod"/>
+            </a:pPr>
+            <a:endParaRPr lang="pt-BR" dirty="0"/>
+          </a:p>
+          <a:p>
+            <a:pPr marL="228600" indent="-228600">
+              <a:buAutoNum type="arabicPeriod"/>
+            </a:pPr>
+            <a:r>
+              <a:rPr lang="pt-BR" dirty="0"/>
+              <a:t>Como você pode fazer Seu cliente disparar o Flag de nova </a:t>
+            </a:r>
+            <a:r>
+              <a:rPr lang="pt-BR" dirty="0" err="1"/>
+              <a:t>mecessidade</a:t>
+            </a:r>
+            <a:r>
+              <a:rPr lang="pt-BR" dirty="0"/>
+              <a:t> nesse momento da </a:t>
+            </a:r>
+            <a:r>
+              <a:rPr lang="pt-BR" dirty="0" err="1"/>
+              <a:t>apresentacao</a:t>
+            </a:r>
+            <a:r>
+              <a:rPr lang="pt-BR" dirty="0"/>
+              <a:t>?</a:t>
+            </a:r>
+          </a:p>
+          <a:p>
+            <a:pPr marL="228600" indent="-228600">
+              <a:buAutoNum type="arabicPeriod"/>
+            </a:pPr>
+            <a:endParaRPr lang="pt-BR" dirty="0"/>
+          </a:p>
+          <a:p>
+            <a:pPr marL="228600" indent="-228600">
+              <a:buAutoNum type="arabicPeriod"/>
+            </a:pPr>
+            <a:r>
+              <a:rPr lang="pt-BR" dirty="0"/>
+              <a:t>O que </a:t>
+            </a:r>
+            <a:r>
+              <a:rPr lang="pt-BR" dirty="0" err="1"/>
+              <a:t>vc</a:t>
+            </a:r>
+            <a:r>
+              <a:rPr lang="pt-BR" dirty="0"/>
+              <a:t> precisa usar de </a:t>
+            </a:r>
+            <a:r>
+              <a:rPr lang="pt-BR" dirty="0" err="1"/>
+              <a:t>slide+fala</a:t>
+            </a:r>
+            <a:r>
+              <a:rPr lang="pt-BR" dirty="0"/>
+              <a:t> para isso</a:t>
             </a:r>
             <a:endParaRPr lang="en-US" dirty="0"/>
           </a:p>
@@ -995,7 +1298,10 @@
           <a:bodyPr/>
           <a:lstStyle/>
           <a:p>
-            <a:endParaRPr lang="en-US"/>
+            <a:r>
+              <a:rPr lang="pt-BR"/>
+              <a:t>Sugiro só uma mudanca no estilo do slide para ficar de acordo com a formatação usada até aqui</a:t>
+            </a:r>
           </a:p>
         </p:txBody>
       </p:sp>
@@ -1163,7 +1469,28 @@
           <a:bodyPr/>
           <a:lstStyle/>
           <a:p>
-            <a:endParaRPr lang="en-US"/>
+            <a:r>
+              <a:rPr lang="pt-BR" dirty="0"/>
+              <a:t>Mudar o titulo</a:t>
+            </a:r>
+          </a:p>
+          <a:p>
+            <a:endParaRPr lang="pt-BR" dirty="0"/>
+          </a:p>
+          <a:p>
+            <a:r>
+              <a:rPr lang="pt-BR" dirty="0"/>
+              <a:t>Que titulo te chamaria atenção e te deixaria curiosa para ver?</a:t>
+            </a:r>
+          </a:p>
+          <a:p>
+            <a:endParaRPr lang="pt-BR" dirty="0"/>
+          </a:p>
+          <a:p>
+            <a:r>
+              <a:rPr lang="pt-BR" dirty="0"/>
+              <a:t>sugestão: “Solução para Geração de Sinais Personalizados para Teste e Validação”</a:t>
+            </a:r>
           </a:p>
         </p:txBody>
       </p:sp>
@@ -1247,7 +1574,40 @@
           <a:bodyPr/>
           <a:lstStyle/>
           <a:p>
-            <a:endParaRPr lang="en-US"/>
+            <a:r>
+              <a:rPr lang="pt-BR" dirty="0"/>
+              <a:t>Troquei por nomes mais “ponto de </a:t>
+            </a:r>
+            <a:r>
+              <a:rPr lang="pt-BR" dirty="0" err="1"/>
+              <a:t>viata</a:t>
+            </a:r>
+            <a:r>
+              <a:rPr lang="pt-BR" dirty="0"/>
+              <a:t> do cliente”. </a:t>
+            </a:r>
+          </a:p>
+          <a:p>
+            <a:endParaRPr lang="pt-BR" dirty="0"/>
+          </a:p>
+          <a:p>
+            <a:r>
+              <a:rPr lang="pt-BR" dirty="0"/>
+              <a:t>Lembre-se de pausar para perguntas ao </a:t>
+            </a:r>
+            <a:r>
+              <a:rPr lang="pt-BR" dirty="0" err="1"/>
+              <a:t>fi</a:t>
+            </a:r>
+            <a:r>
+              <a:rPr lang="pt-BR" dirty="0"/>
+              <a:t> al de cada um desses </a:t>
+            </a:r>
+            <a:r>
+              <a:rPr lang="pt-BR" dirty="0" err="1"/>
+              <a:t>topicos</a:t>
+            </a:r>
+            <a:endParaRPr lang="pt-BR" dirty="0"/>
           </a:p>
         </p:txBody>
       </p:sp>
@@ -1331,11 +1691,138 @@
           <a:bodyPr/>
           <a:lstStyle/>
           <a:p>
+            <a:pPr marL="228600" indent="-228600">
+              <a:buAutoNum type="arabicPeriod"/>
+            </a:pPr>
             <a:r>
               <a:rPr lang="pt-BR" dirty="0"/>
-              <a:t>1. ENGAGING: O que o cliente precisa? Quais pontos podem ser melhorados/otimizados em sua aplicação? Como posso ajudar a melhorar a rotina de trabalho do cliente? </a:t>
-            </a:r>
-            <a:endParaRPr lang="en-US" dirty="0"/>
+              <a:t>ENGAGING: O que o cliente precisa? Quais pontos podem ser melhorados/otimizados em sua aplicação? Como posso ajudar a melhorar a rotina de trabalho do cliente? </a:t>
+            </a:r>
+          </a:p>
+          <a:p>
+            <a:pPr marL="228600" indent="-228600">
+              <a:buAutoNum type="arabicPeriod"/>
+            </a:pPr>
+            <a:endParaRPr lang="pt-BR" dirty="0"/>
+          </a:p>
+          <a:p>
+            <a:pPr marL="228600" indent="-228600">
+              <a:buAutoNum type="arabicPeriod"/>
+            </a:pPr>
+            <a:r>
+              <a:rPr lang="pt-BR" dirty="0"/>
+              <a:t>Um pouco de </a:t>
+            </a:r>
+            <a:r>
+              <a:rPr lang="pt-BR" dirty="0" err="1"/>
+              <a:t>Due</a:t>
+            </a:r>
+            <a:r>
+              <a:rPr lang="pt-BR" dirty="0"/>
+              <a:t> </a:t>
+            </a:r>
+            <a:r>
+              <a:rPr lang="pt-BR" dirty="0" err="1"/>
+              <a:t>Diligence</a:t>
+            </a:r>
+            <a:r>
+              <a:rPr lang="pt-BR" dirty="0"/>
+              <a:t>....quem é o cliente? o que ele faz? Ele é </a:t>
+            </a:r>
+            <a:r>
+              <a:rPr lang="pt-BR" dirty="0" err="1"/>
+              <a:t>decision</a:t>
+            </a:r>
+            <a:r>
+              <a:rPr lang="pt-BR" dirty="0"/>
+              <a:t> </a:t>
+            </a:r>
+            <a:r>
+              <a:rPr lang="pt-BR" dirty="0" err="1"/>
+              <a:t>maker</a:t>
+            </a:r>
+            <a:r>
+              <a:rPr lang="pt-BR" dirty="0"/>
+              <a:t>? A companhia dele tem relevância para a sua empresa?</a:t>
+            </a:r>
+          </a:p>
+          <a:p>
+            <a:pPr marL="228600" indent="-228600">
+              <a:buAutoNum type="arabicPeriod"/>
+            </a:pPr>
+            <a:endParaRPr lang="pt-BR" dirty="0"/>
+          </a:p>
+          <a:p>
+            <a:pPr marL="228600" indent="-228600">
+              <a:buAutoNum type="arabicPeriod"/>
+            </a:pPr>
+            <a:r>
+              <a:rPr lang="pt-BR" dirty="0"/>
+              <a:t>Diz algo como....busquei no </a:t>
+            </a:r>
+            <a:r>
+              <a:rPr lang="pt-BR" dirty="0" err="1"/>
+              <a:t>salesforce</a:t>
+            </a:r>
+            <a:r>
+              <a:rPr lang="pt-BR" dirty="0"/>
+              <a:t> o </a:t>
+            </a:r>
+            <a:r>
+              <a:rPr lang="pt-BR" dirty="0" err="1"/>
+              <a:t>historico</a:t>
+            </a:r>
+            <a:r>
+              <a:rPr lang="pt-BR" dirty="0"/>
+              <a:t> de compra do cliente e o que as ultimas </a:t>
+            </a:r>
+            <a:r>
+              <a:rPr lang="pt-BR" dirty="0" err="1"/>
+              <a:t>interwcoes</a:t>
+            </a:r>
+            <a:r>
+              <a:rPr lang="pt-BR" dirty="0"/>
+              <a:t> deles com a NI. Percebi </a:t>
+            </a:r>
+            <a:r>
+              <a:rPr lang="pt-BR" dirty="0" err="1"/>
+              <a:t>qie</a:t>
+            </a:r>
+            <a:r>
+              <a:rPr lang="pt-BR" dirty="0"/>
+              <a:t> ele era um entusiasta dos nossos produtos, e em uma conversa, ele me disse que via a </a:t>
+            </a:r>
+            <a:r>
+              <a:rPr lang="pt-BR" dirty="0" err="1"/>
+              <a:t>possibikidade</a:t>
+            </a:r>
+            <a:r>
+              <a:rPr lang="pt-BR" dirty="0"/>
+              <a:t> de usar NI no projeto....</a:t>
+            </a:r>
+          </a:p>
+          <a:p>
+            <a:pPr marL="228600" indent="-228600">
+              <a:buAutoNum type="arabicPeriod"/>
+            </a:pPr>
+            <a:endParaRPr lang="pt-BR" dirty="0"/>
+          </a:p>
+          <a:p>
+            <a:pPr marL="228600" indent="-228600">
+              <a:buAutoNum type="arabicPeriod"/>
+            </a:pPr>
+            <a:r>
+              <a:rPr lang="pt-BR" dirty="0"/>
+              <a:t>Há uma verba dedicada à compra de instrumentos, mas ele acredita que consegue convencer o chefe a trocar os instrumentos combinados em uma </a:t>
+            </a:r>
+            <a:r>
+              <a:rPr lang="pt-BR" dirty="0" err="1"/>
+              <a:t>somicao</a:t>
+            </a:r>
+            <a:r>
+              <a:rPr lang="pt-BR" dirty="0"/>
+              <a:t> com hw e SW.</a:t>
+            </a:r>
           </a:p>
         </p:txBody>
       </p:sp>
@@ -1423,7 +1910,54 @@
               <a:rPr lang="pt-BR" dirty="0"/>
               <a:t>2. EXPLAINING</a:t>
             </a:r>
-            <a:endParaRPr lang="en-US" dirty="0"/>
+          </a:p>
+          <a:p>
+            <a:endParaRPr lang="pt-BR" dirty="0"/>
+          </a:p>
+          <a:p>
+            <a:r>
+              <a:rPr lang="pt-BR" dirty="0"/>
+              <a:t>Ele me explicou que....(requisitos)</a:t>
+            </a:r>
+          </a:p>
+          <a:p>
+            <a:endParaRPr lang="pt-BR" dirty="0"/>
+          </a:p>
+          <a:p>
+            <a:r>
+              <a:rPr lang="pt-BR" dirty="0"/>
+              <a:t>Em uma segunda </a:t>
+            </a:r>
+            <a:r>
+              <a:rPr lang="pt-BR" dirty="0" err="1"/>
+              <a:t>reuniao</a:t>
+            </a:r>
+            <a:r>
+              <a:rPr lang="pt-BR" dirty="0"/>
+              <a:t> por telefone, ele me apresentou o X da Silva, que seria um desenvolvedor de SW que teve experiencia em LabVIEW na faculdade e </a:t>
+            </a:r>
+            <a:r>
+              <a:rPr lang="pt-BR" dirty="0" err="1"/>
+              <a:t>giataria</a:t>
+            </a:r>
+            <a:r>
+              <a:rPr lang="pt-BR" dirty="0"/>
+              <a:t> de </a:t>
+            </a:r>
+            <a:r>
+              <a:rPr lang="pt-BR" dirty="0" err="1"/>
+              <a:t>automatozar</a:t>
+            </a:r>
+            <a:r>
+              <a:rPr lang="pt-BR" dirty="0"/>
+              <a:t> algumas coisas no Lab.</a:t>
+            </a:r>
+          </a:p>
+          <a:p>
+            <a:endParaRPr lang="pt-BR" dirty="0"/>
+          </a:p>
+          <a:p>
+            <a:endParaRPr lang="pt-BR" dirty="0"/>
           </a:p>
         </p:txBody>
       </p:sp>
@@ -1511,6 +2045,23 @@
               <a:rPr lang="pt-BR" dirty="0"/>
               <a:t>3. EXPLORING</a:t>
             </a:r>
+          </a:p>
+          <a:p>
+            <a:endParaRPr lang="pt-BR" dirty="0"/>
+          </a:p>
+          <a:p>
+            <a:r>
+              <a:rPr lang="pt-BR" dirty="0"/>
+              <a:t>Analisando o que </a:t>
+            </a:r>
+            <a:r>
+              <a:rPr lang="pt-BR" dirty="0" err="1"/>
+              <a:t>gordon</a:t>
+            </a:r>
+            <a:r>
+              <a:rPr lang="pt-BR" dirty="0"/>
+              <a:t> e X me falaram pude explorar algumas opções dentro do nosso portfólio... Apresentei essas opções ao Gordon e recomendei alguns webinars para eles olharem </a:t>
+            </a:r>
             <a:endParaRPr lang="en-US" dirty="0"/>
           </a:p>
         </p:txBody>
@@ -1607,6 +2158,81 @@
               <a:rPr lang="pt-BR" dirty="0"/>
               <a:t> 5. CONSIDERING</a:t>
             </a:r>
+          </a:p>
+          <a:p>
+            <a:endParaRPr lang="pt-BR" dirty="0"/>
+          </a:p>
+          <a:p>
+            <a:r>
+              <a:rPr lang="pt-BR" dirty="0"/>
+              <a:t>Chegamos à conclusão que a NI consegue fornecer uma </a:t>
+            </a:r>
+            <a:r>
+              <a:rPr lang="pt-BR" dirty="0" err="1"/>
+              <a:t>solucao</a:t>
+            </a:r>
+            <a:r>
+              <a:rPr lang="pt-BR" dirty="0"/>
+              <a:t> alternativa aos instrumentos </a:t>
+            </a:r>
+            <a:r>
+              <a:rPr lang="pt-BR" dirty="0" err="1"/>
+              <a:t>primeoramente</a:t>
+            </a:r>
+            <a:r>
+              <a:rPr lang="pt-BR" dirty="0"/>
+              <a:t> </a:t>
+            </a:r>
+            <a:r>
+              <a:rPr lang="pt-BR" dirty="0" err="1"/>
+              <a:t>consoderados</a:t>
+            </a:r>
+            <a:r>
+              <a:rPr lang="pt-BR" dirty="0"/>
+              <a:t>, pelo fato de.....</a:t>
+            </a:r>
+          </a:p>
+          <a:p>
+            <a:endParaRPr lang="pt-BR" dirty="0"/>
+          </a:p>
+          <a:p>
+            <a:r>
+              <a:rPr lang="pt-BR" dirty="0"/>
+              <a:t>Agora, eu precisei entender o que </a:t>
+            </a:r>
+            <a:r>
+              <a:rPr lang="pt-BR" dirty="0" err="1"/>
+              <a:t>seria.uma</a:t>
+            </a:r>
+            <a:r>
+              <a:rPr lang="pt-BR" dirty="0"/>
+              <a:t> </a:t>
+            </a:r>
+            <a:r>
+              <a:rPr lang="pt-BR" dirty="0" err="1"/>
+              <a:t>solucao</a:t>
+            </a:r>
+            <a:r>
+              <a:rPr lang="pt-BR" dirty="0"/>
+              <a:t> que realmente atendesse as necessidades dele.</a:t>
+            </a:r>
+          </a:p>
+          <a:p>
+            <a:endParaRPr lang="pt-BR" dirty="0"/>
+          </a:p>
+          <a:p>
+            <a:r>
+              <a:rPr lang="pt-BR" dirty="0"/>
+              <a:t>assim, cheguei a seguinte </a:t>
+            </a:r>
+            <a:r>
+              <a:rPr lang="pt-BR" dirty="0" err="1"/>
+              <a:t>solucao</a:t>
+            </a:r>
+            <a:r>
+              <a:rPr lang="pt-BR" dirty="0"/>
+              <a:t>...</a:t>
+            </a:r>
             <a:endParaRPr lang="en-US" dirty="0"/>
           </a:p>
         </p:txBody>
@@ -1695,7 +2321,40 @@
               <a:rPr lang="pt-BR" dirty="0"/>
               <a:t>6. COMMITING</a:t>
             </a:r>
-            <a:endParaRPr lang="en-US" dirty="0"/>
+          </a:p>
+          <a:p>
+            <a:endParaRPr lang="pt-BR" dirty="0"/>
+          </a:p>
+          <a:p>
+            <a:r>
+              <a:rPr lang="pt-BR" dirty="0"/>
+              <a:t>Não precisa explicar agora cada parte da interface, mas tente fazer com </a:t>
+            </a:r>
+            <a:r>
+              <a:rPr lang="pt-BR" dirty="0" err="1"/>
+              <a:t>qie</a:t>
+            </a:r>
+            <a:r>
+              <a:rPr lang="pt-BR" dirty="0"/>
+              <a:t> a plateia consiga ter uma </a:t>
+            </a:r>
+            <a:r>
+              <a:rPr lang="pt-BR" dirty="0" err="1"/>
+              <a:t>nocao</a:t>
+            </a:r>
+            <a:r>
+              <a:rPr lang="pt-BR" dirty="0"/>
+              <a:t> de que essa interface atende aos requisitos elencados no slide </a:t>
+            </a:r>
+          </a:p>
+          <a:p>
+            <a:endParaRPr lang="pt-BR" dirty="0"/>
+          </a:p>
+          <a:p>
+            <a:r>
+              <a:rPr lang="pt-BR" dirty="0"/>
+              <a:t>Efeitos no slide podem te ajudar a não ter que apontar com o dedo, ficando na frente da tela.</a:t>
+            </a:r>
           </a:p>
         </p:txBody>
       </p:sp>
@@ -1725,7 +2384,7 @@
     </p:spTree>
     <p:extLst>
       <p:ext uri="{BB962C8B-B14F-4D97-AF65-F5344CB8AC3E}">
-        <p14:creationId xmlns:p14="http://schemas.microsoft.com/office/powerpoint/2010/main" val="2189193106"/>
+        <p14:creationId xmlns:p14="http://schemas.microsoft.com/office/powerpoint/2010/main" val="771772154"/>
       </p:ext>
     </p:extLst>
   </p:cSld>
@@ -1782,6 +2441,32 @@
             <a:r>
               <a:rPr lang="pt-BR" dirty="0"/>
               <a:t>6. COMMITING</a:t>
+            </a:r>
+          </a:p>
+          <a:p>
+            <a:endParaRPr lang="pt-BR" dirty="0"/>
+          </a:p>
+          <a:p>
+            <a:r>
+              <a:rPr lang="pt-BR" dirty="0"/>
+              <a:t>Por que sua plateia iria querer saber que há um instalador? </a:t>
+            </a:r>
+          </a:p>
+          <a:p>
+            <a:endParaRPr lang="pt-BR" dirty="0"/>
+          </a:p>
+          <a:p>
+            <a:r>
+              <a:rPr lang="pt-BR" dirty="0"/>
+              <a:t>Tente responder essa pergunta para achar e apresentar o valor agregado </a:t>
+            </a:r>
+            <a:r>
+              <a:rPr lang="pt-BR" dirty="0" err="1"/>
+              <a:t>nease</a:t>
+            </a:r>
+            <a:r>
+              <a:rPr lang="pt-BR" dirty="0"/>
+              <a:t> slide.</a:t>
             </a:r>
             <a:endParaRPr lang="en-US" dirty="0"/>
           </a:p>
@@ -6446,7 +7131,7 @@
           <a:p>
             <a:fld id="{A479B961-B0C3-4F16-8044-1FC7A8EFA7C5}" type="datetimeFigureOut">
               <a:rPr lang="pt-BR" smtClean="0"/>
-              <a:t>17/07/2018</a:t>
+              <a:t>20/07/2018</a:t>
             </a:fld>
             <a:endParaRPr lang="pt-BR"/>
           </a:p>
@@ -26108,59 +26793,29 @@
             <p:ph type="title"/>
           </p:nvPr>
         </p:nvSpPr>
-        <p:spPr/>
+        <p:spPr>
+          <a:xfrm>
+            <a:off x="605368" y="2980658"/>
+            <a:ext cx="10981265" cy="388812"/>
+          </a:xfrm>
+        </p:spPr>
         <p:txBody>
           <a:bodyPr/>
           <a:lstStyle/>
           <a:p>
-            <a:r>
-              <a:rPr lang="pt-BR" dirty="0"/>
-              <a:t>Gerador de Sinais - Funcionamento</a:t>
+            <a:pPr algn="ctr"/>
+            <a:r>
+              <a:rPr lang="pt-BR"/>
+              <a:t>Demonstração</a:t>
             </a:r>
             <a:endParaRPr lang="en-US" dirty="0"/>
-          </a:p>
-        </p:txBody>
-      </p:sp>
-      <p:sp>
-        <p:nvSpPr>
-          <p:cNvPr id="3" name="CaixaDeTexto 2">
-            <a:extLst>
-              <a:ext uri="{FF2B5EF4-FFF2-40B4-BE49-F238E27FC236}">
-                <a16:creationId xmlns:a16="http://schemas.microsoft.com/office/drawing/2014/main" id="{98CBFD02-5271-4AFF-9745-F7C6AF651EC3}"/>
-              </a:ext>
-            </a:extLst>
-          </p:cNvPr>
-          <p:cNvSpPr txBox="1"/>
-          <p:nvPr/>
-        </p:nvSpPr>
-        <p:spPr>
-          <a:xfrm>
-            <a:off x="5818454" y="3259723"/>
-            <a:ext cx="546625" cy="338554"/>
-          </a:xfrm>
-          <a:prstGeom prst="rect">
-            <a:avLst/>
-          </a:prstGeom>
-          <a:noFill/>
-        </p:spPr>
-        <p:txBody>
-          <a:bodyPr wrap="none" lIns="0" rIns="0" rtlCol="0">
-            <a:spAutoFit/>
-          </a:bodyPr>
-          <a:lstStyle/>
-          <a:p>
-            <a:r>
-              <a:rPr lang="pt-BR" sz="1600" dirty="0"/>
-              <a:t>Demo</a:t>
-            </a:r>
-            <a:endParaRPr lang="en-US" sz="1600" dirty="0" err="1"/>
           </a:p>
         </p:txBody>
       </p:sp>
     </p:spTree>
     <p:extLst>
       <p:ext uri="{BB962C8B-B14F-4D97-AF65-F5344CB8AC3E}">
-        <p14:creationId xmlns:p14="http://schemas.microsoft.com/office/powerpoint/2010/main" val="409166416"/>
+        <p14:creationId xmlns:p14="http://schemas.microsoft.com/office/powerpoint/2010/main" val="2455165799"/>
       </p:ext>
     </p:extLst>
   </p:cSld>
@@ -26328,52 +26983,22 @@
             <p:ph type="title"/>
           </p:nvPr>
         </p:nvSpPr>
-        <p:spPr/>
+        <p:spPr>
+          <a:xfrm>
+            <a:off x="605368" y="2980658"/>
+            <a:ext cx="10981265" cy="388812"/>
+          </a:xfrm>
+        </p:spPr>
         <p:txBody>
           <a:bodyPr/>
           <a:lstStyle/>
           <a:p>
-            <a:r>
-              <a:rPr lang="pt-BR" dirty="0"/>
-              <a:t>Gerador de Sinais - Programação</a:t>
+            <a:pPr algn="ctr"/>
+            <a:r>
+              <a:rPr lang="pt-BR"/>
+              <a:t>Demonstração</a:t>
             </a:r>
             <a:endParaRPr lang="en-US" dirty="0"/>
-          </a:p>
-        </p:txBody>
-      </p:sp>
-      <p:sp>
-        <p:nvSpPr>
-          <p:cNvPr id="7" name="CaixaDeTexto 6">
-            <a:extLst>
-              <a:ext uri="{FF2B5EF4-FFF2-40B4-BE49-F238E27FC236}">
-                <a16:creationId xmlns:a16="http://schemas.microsoft.com/office/drawing/2014/main" id="{39BC704D-AE7D-4ED9-A2FD-F778469E5FA0}"/>
-              </a:ext>
-            </a:extLst>
-          </p:cNvPr>
-          <p:cNvSpPr txBox="1"/>
-          <p:nvPr/>
-        </p:nvSpPr>
-        <p:spPr>
-          <a:xfrm>
-            <a:off x="5818454" y="3259723"/>
-            <a:ext cx="546625" cy="338554"/>
-          </a:xfrm>
-          <a:prstGeom prst="rect">
-            <a:avLst/>
-          </a:prstGeom>
-          <a:noFill/>
-        </p:spPr>
-        <p:txBody>
-          <a:bodyPr wrap="none" lIns="0" rIns="0" rtlCol="0">
-            <a:spAutoFit/>
-          </a:bodyPr>
-          <a:lstStyle/>
-          <a:p>
-            <a:r>
-              <a:rPr lang="pt-BR" sz="1600" dirty="0"/>
-              <a:t>Demo</a:t>
-            </a:r>
-            <a:endParaRPr lang="en-US" sz="1600" dirty="0" err="1"/>
           </a:p>
         </p:txBody>
       </p:sp>
@@ -26429,8 +27054,12 @@
           <a:lstStyle/>
           <a:p>
             <a:r>
+              <a:rPr lang="pt-BR"/>
+              <a:t>Possibilidades </a:t>
+            </a:r>
+            <a:r>
               <a:rPr lang="pt-BR" dirty="0"/>
-              <a:t>Melhorias Futuras</a:t>
+              <a:t>Futuras</a:t>
             </a:r>
             <a:endParaRPr lang="en-US" dirty="0"/>
           </a:p>
@@ -26541,38 +27170,73 @@
       </p:grpSpPr>
       <p:sp>
         <p:nvSpPr>
-          <p:cNvPr id="11" name="Título 1">
+          <p:cNvPr id="3" name="Título 1">
             <a:extLst>
               <a:ext uri="{FF2B5EF4-FFF2-40B4-BE49-F238E27FC236}">
-                <a16:creationId xmlns:a16="http://schemas.microsoft.com/office/drawing/2014/main" id="{C009E1DD-1C49-41BC-81B8-719D7E79B48D}"/>
+                <a16:creationId xmlns:a16="http://schemas.microsoft.com/office/drawing/2014/main" id="{762A085E-2F45-2440-91E4-3C130F42E061}"/>
               </a:ext>
             </a:extLst>
           </p:cNvPr>
-          <p:cNvSpPr>
+          <p:cNvSpPr txBox="1">
             <a:spLocks noGrp="1"/>
           </p:cNvSpPr>
           <p:nvPr>
-            <p:ph type="title"/>
+            <p:ph type="body" sz="quarter" idx="10"/>
           </p:nvPr>
         </p:nvSpPr>
         <p:spPr>
           <a:xfrm>
-            <a:off x="609600" y="3124200"/>
-            <a:ext cx="10972800" cy="609600"/>
-          </a:xfrm>
-        </p:spPr>
-        <p:txBody>
-          <a:bodyPr/>
-          <a:lstStyle/>
-          <a:p>
-            <a:pPr algn="r"/>
-            <a:r>
-              <a:rPr lang="pt-BR" sz="3600" dirty="0">
+            <a:off x="0" y="2766484"/>
+            <a:ext cx="12204700" cy="1109133"/>
+          </a:xfrm>
+          <a:prstGeom prst="rect">
+            <a:avLst/>
+          </a:prstGeom>
+        </p:spPr>
+        <p:txBody>
+          <a:bodyPr vert="horz" lIns="0" tIns="45720" rIns="0" bIns="45720" rtlCol="0" anchor="ctr">
+            <a:noAutofit/>
+          </a:bodyPr>
+          <a:lstStyle>
+            <a:lvl1pPr algn="l" defTabSz="1219170" rtl="0" eaLnBrk="1" latinLnBrk="0" hangingPunct="1">
+              <a:lnSpc>
+                <a:spcPct val="90000"/>
+              </a:lnSpc>
+              <a:spcBef>
+                <a:spcPct val="0"/>
+              </a:spcBef>
+              <a:buNone/>
+              <a:defRPr sz="3200" b="0" i="0" kern="1000" spc="0" baseline="0">
+                <a:solidFill>
+                  <a:schemeClr val="bg2">
+                    <a:lumMod val="25000"/>
+                  </a:schemeClr>
+                </a:solidFill>
+                <a:latin typeface="+mn-lt"/>
+                <a:ea typeface="Arial" charset="0"/>
+                <a:cs typeface="Arial" charset="0"/>
+              </a:defRPr>
+            </a:lvl1pPr>
+          </a:lstStyle>
+          <a:p>
+            <a:pPr algn="ctr"/>
+            <a:r>
+              <a:rPr lang="pt-BR" sz="3600">
+                <a:solidFill>
+                  <a:schemeClr val="bg1"/>
+                </a:solidFill>
                 <a:latin typeface="+mj-lt"/>
                 <a:cs typeface="Times New Roman" panose="02020603050405020304" pitchFamily="18" charset="0"/>
               </a:rPr>
               <a:t>Perguntas e Sugestões</a:t>
             </a:r>
+            <a:endParaRPr lang="pt-BR" sz="3600" dirty="0">
+              <a:solidFill>
+                <a:schemeClr val="bg1"/>
+              </a:solidFill>
+              <a:latin typeface="+mj-lt"/>
+              <a:cs typeface="Times New Roman" panose="02020603050405020304" pitchFamily="18" charset="0"/>
+            </a:endParaRPr>
           </a:p>
         </p:txBody>
       </p:sp>
@@ -26656,20 +27320,17 @@
           <a:bodyPr/>
           <a:lstStyle/>
           <a:p>
-            <a:pPr algn="ctr"/>
-            <a:r>
-              <a:rPr lang="pt-BR" sz="4000" dirty="0">
-                <a:latin typeface="+mj-lt"/>
-                <a:cs typeface="Times New Roman" panose="02020603050405020304" pitchFamily="18" charset="0"/>
-              </a:rPr>
-              <a:t>Project </a:t>
-            </a:r>
-            <a:r>
-              <a:rPr lang="pt-BR" sz="4000" dirty="0" err="1">
-                <a:latin typeface="+mj-lt"/>
-                <a:cs typeface="Times New Roman" panose="02020603050405020304" pitchFamily="18" charset="0"/>
-              </a:rPr>
-              <a:t>Result</a:t>
+            <a:r>
+              <a:rPr lang="pt-BR" sz="4000" dirty="0"/>
+              <a:t>Solução para </a:t>
+            </a:r>
+            <a:r>
+              <a:rPr lang="pt-BR" sz="4000" i="1" dirty="0"/>
+              <a:t>Geração de Sinais </a:t>
+            </a:r>
+            <a:r>
+              <a:rPr lang="pt-BR" sz="4000" dirty="0"/>
+              <a:t>Personalizados para Teste e Validação</a:t>
             </a:r>
             <a:endParaRPr lang="pt-BR" sz="4000" dirty="0">
               <a:latin typeface="+mj-lt"/>
@@ -26784,7 +27445,12 @@
             <p:ph idx="1"/>
           </p:nvPr>
         </p:nvSpPr>
-        <p:spPr/>
+        <p:spPr>
+          <a:xfrm>
+            <a:off x="605367" y="980863"/>
+            <a:ext cx="10972800" cy="4896273"/>
+          </a:xfrm>
+        </p:spPr>
         <p:txBody>
           <a:bodyPr/>
           <a:lstStyle/>
@@ -26792,9 +27458,12 @@
             <a:endParaRPr lang="pt-BR" dirty="0"/>
           </a:p>
           <a:p>
+            <a:endParaRPr lang="pt-BR" dirty="0"/>
+          </a:p>
+          <a:p>
             <a:r>
               <a:rPr lang="pt-BR" dirty="0"/>
-              <a:t>Resumo do projeto</a:t>
+              <a:t>Aplicação e Necessidade</a:t>
             </a:r>
           </a:p>
           <a:p>
@@ -26803,7 +27472,7 @@
           <a:p>
             <a:r>
               <a:rPr lang="pt-BR" dirty="0"/>
-              <a:t>Desenvolvimento</a:t>
+              <a:t>Solução Proposta</a:t>
             </a:r>
           </a:p>
           <a:p>
@@ -26821,7 +27490,7 @@
           <a:p>
             <a:r>
               <a:rPr lang="pt-BR" dirty="0"/>
-              <a:t>Próximos Passos</a:t>
+              <a:t>Melhorias futuras e novos recursos</a:t>
             </a:r>
           </a:p>
         </p:txBody>
@@ -26903,8 +27572,8 @@
         </p:nvSpPr>
         <p:spPr>
           <a:xfrm>
-            <a:off x="605367" y="4314485"/>
-            <a:ext cx="10972799" cy="1456947"/>
+            <a:off x="682659" y="4611980"/>
+            <a:ext cx="10972799" cy="1204833"/>
           </a:xfrm>
         </p:spPr>
         <p:txBody>
@@ -26952,8 +27621,8 @@
         </p:nvSpPr>
         <p:spPr>
           <a:xfrm>
-            <a:off x="536542" y="1338682"/>
-            <a:ext cx="6493524" cy="3111108"/>
+            <a:off x="533298" y="1057354"/>
+            <a:ext cx="6493524" cy="3849772"/>
           </a:xfrm>
           <a:prstGeom prst="rect">
             <a:avLst/>
@@ -26990,7 +27659,29 @@
                 </a:solidFill>
                 <a:cs typeface="Arial" charset="0"/>
               </a:rPr>
-              <a:t>Há alguns meses, Gordon Freeman percebeu um ponto de melhoria em seu trabalho no Laboratório de Coleta de Dados. </a:t>
+              <a:t>Há alguns meses, </a:t>
+            </a:r>
+            <a:r>
+              <a:rPr lang="pt-BR" sz="2400">
+                <a:solidFill>
+                  <a:schemeClr val="bg2">
+                    <a:lumMod val="25000"/>
+                  </a:schemeClr>
+                </a:solidFill>
+                <a:cs typeface="Arial" charset="0"/>
+              </a:rPr>
+              <a:t>Gordon Freeman, Engenheiro de Testes na IDO S/A </a:t>
+            </a:r>
+            <a:r>
+              <a:rPr lang="pt-BR" sz="2400" dirty="0">
+                <a:solidFill>
+                  <a:schemeClr val="bg2">
+                    <a:lumMod val="25000"/>
+                  </a:schemeClr>
+                </a:solidFill>
+                <a:cs typeface="Arial" charset="0"/>
+              </a:rPr>
+              <a:t>percebeu um ponto de melhoria em seu trabalho no Laboratório de Coleta de Dados. </a:t>
             </a:r>
           </a:p>
           <a:p>
@@ -27021,7 +27712,7 @@
               </a:tabLst>
             </a:pPr>
             <a:r>
-              <a:rPr lang="pt-BR" sz="2400" dirty="0">
+              <a:rPr lang="pt-BR" sz="2400">
                 <a:solidFill>
                   <a:schemeClr val="bg2">
                     <a:lumMod val="25000"/>
@@ -27029,8 +27720,38 @@
                 </a:solidFill>
                 <a:cs typeface="Arial" charset="0"/>
               </a:rPr>
-              <a:t>Gordon realizava testes de verificação de sinais aleatórios e para isso utilizava diversos aparelhos como osciloscópios, geradores de funções e fontes de tensão. </a:t>
-            </a:r>
+              <a:t>Gordon realiza </a:t>
+            </a:r>
+            <a:r>
+              <a:rPr lang="pt-BR" sz="2400" dirty="0">
+                <a:solidFill>
+                  <a:schemeClr val="bg2">
+                    <a:lumMod val="25000"/>
+                  </a:schemeClr>
+                </a:solidFill>
+                <a:cs typeface="Arial" charset="0"/>
+              </a:rPr>
+              <a:t>testes de verificação de sinais aleatórios e para isso utilizava diversos aparelhos como osciloscópios, geradores de funções e fontes de </a:t>
+            </a:r>
+            <a:r>
+              <a:rPr lang="pt-BR" sz="2400">
+                <a:solidFill>
+                  <a:schemeClr val="bg2">
+                    <a:lumMod val="25000"/>
+                  </a:schemeClr>
+                </a:solidFill>
+                <a:cs typeface="Arial" charset="0"/>
+              </a:rPr>
+              <a:t>tensão. Um teste de verificacao hoje leva 2 horas. </a:t>
+            </a:r>
+            <a:endParaRPr lang="pt-BR" sz="2400" dirty="0">
+              <a:solidFill>
+                <a:schemeClr val="bg2">
+                  <a:lumMod val="25000"/>
+                </a:schemeClr>
+              </a:solidFill>
+              <a:cs typeface="Arial" charset="0"/>
+            </a:endParaRPr>
           </a:p>
         </p:txBody>
       </p:sp>
@@ -28277,7 +28998,7 @@
         </p:blipFill>
         <p:spPr bwMode="auto">
           <a:xfrm>
-            <a:off x="8179217" y="2926335"/>
+            <a:off x="8191248" y="3039568"/>
             <a:ext cx="1400175" cy="1400175"/>
           </a:xfrm>
           <a:prstGeom prst="rect">
@@ -28369,15 +29090,21 @@
           <p:nvPr/>
         </p:nvPicPr>
         <p:blipFill>
-          <a:blip r:embed="rId3"/>
+          <a:blip r:embed="rId3">
+            <a:extLst>
+              <a:ext uri="{28A0092B-C50C-407E-A947-70E740481C1C}">
+                <a14:useLocalDpi xmlns:a14="http://schemas.microsoft.com/office/drawing/2010/main" val="0"/>
+              </a:ext>
+            </a:extLst>
+          </a:blip>
           <a:stretch>
             <a:fillRect/>
           </a:stretch>
         </p:blipFill>
         <p:spPr>
           <a:xfrm>
-            <a:off x="3826842" y="1151019"/>
-            <a:ext cx="7983133" cy="4555962"/>
+            <a:off x="3770628" y="1160824"/>
+            <a:ext cx="8039348" cy="4568434"/>
           </a:xfrm>
           <a:prstGeom prst="rect">
             <a:avLst/>
@@ -28765,13 +29492,950 @@
     </p:spTree>
     <p:extLst>
       <p:ext uri="{BB962C8B-B14F-4D97-AF65-F5344CB8AC3E}">
-        <p14:creationId xmlns:p14="http://schemas.microsoft.com/office/powerpoint/2010/main" val="1522190637"/>
+        <p14:creationId xmlns:p14="http://schemas.microsoft.com/office/powerpoint/2010/main" val="2550523831"/>
       </p:ext>
     </p:extLst>
   </p:cSld>
   <p:clrMapOvr>
     <a:masterClrMapping/>
   </p:clrMapOvr>
+  <p:timing>
+    <p:tnLst>
+      <p:par>
+        <p:cTn id="1" dur="indefinite" restart="never" nodeType="tmRoot">
+          <p:childTnLst>
+            <p:seq concurrent="1" nextAc="seek">
+              <p:cTn id="2" dur="indefinite" nodeType="mainSeq">
+                <p:childTnLst>
+                  <p:par>
+                    <p:cTn id="3" fill="hold">
+                      <p:stCondLst>
+                        <p:cond delay="indefinite"/>
+                      </p:stCondLst>
+                      <p:childTnLst>
+                        <p:par>
+                          <p:cTn id="4" fill="hold">
+                            <p:stCondLst>
+                              <p:cond delay="0"/>
+                            </p:stCondLst>
+                            <p:childTnLst>
+                              <p:par>
+                                <p:cTn id="5" presetID="42" presetClass="entr" presetSubtype="0" fill="hold" nodeType="clickEffect">
+                                  <p:stCondLst>
+                                    <p:cond delay="0"/>
+                                  </p:stCondLst>
+                                  <p:childTnLst>
+                                    <p:set>
+                                      <p:cBhvr>
+                                        <p:cTn id="6" dur="1" fill="hold">
+                                          <p:stCondLst>
+                                            <p:cond delay="0"/>
+                                          </p:stCondLst>
+                                        </p:cTn>
+                                        <p:tgtEl>
+                                          <p:spTgt spid="17"/>
+                                        </p:tgtEl>
+                                        <p:attrNameLst>
+                                          <p:attrName>style.visibility</p:attrName>
+                                        </p:attrNameLst>
+                                      </p:cBhvr>
+                                      <p:to>
+                                        <p:strVal val="visible"/>
+                                      </p:to>
+                                    </p:set>
+                                    <p:animEffect transition="in" filter="fade">
+                                      <p:cBhvr>
+                                        <p:cTn id="7" dur="1000"/>
+                                        <p:tgtEl>
+                                          <p:spTgt spid="17"/>
+                                        </p:tgtEl>
+                                      </p:cBhvr>
+                                    </p:animEffect>
+                                    <p:anim calcmode="lin" valueType="num">
+                                      <p:cBhvr>
+                                        <p:cTn id="8" dur="1000" fill="hold"/>
+                                        <p:tgtEl>
+                                          <p:spTgt spid="17"/>
+                                        </p:tgtEl>
+                                        <p:attrNameLst>
+                                          <p:attrName>ppt_x</p:attrName>
+                                        </p:attrNameLst>
+                                      </p:cBhvr>
+                                      <p:tavLst>
+                                        <p:tav tm="0">
+                                          <p:val>
+                                            <p:strVal val="#ppt_x"/>
+                                          </p:val>
+                                        </p:tav>
+                                        <p:tav tm="100000">
+                                          <p:val>
+                                            <p:strVal val="#ppt_x"/>
+                                          </p:val>
+                                        </p:tav>
+                                      </p:tavLst>
+                                    </p:anim>
+                                    <p:anim calcmode="lin" valueType="num">
+                                      <p:cBhvr>
+                                        <p:cTn id="9" dur="1000" fill="hold"/>
+                                        <p:tgtEl>
+                                          <p:spTgt spid="17"/>
+                                        </p:tgtEl>
+                                        <p:attrNameLst>
+                                          <p:attrName>ppt_y</p:attrName>
+                                        </p:attrNameLst>
+                                      </p:cBhvr>
+                                      <p:tavLst>
+                                        <p:tav tm="0">
+                                          <p:val>
+                                            <p:strVal val="#ppt_y+.1"/>
+                                          </p:val>
+                                        </p:tav>
+                                        <p:tav tm="100000">
+                                          <p:val>
+                                            <p:strVal val="#ppt_y"/>
+                                          </p:val>
+                                        </p:tav>
+                                      </p:tavLst>
+                                    </p:anim>
+                                  </p:childTnLst>
+                                </p:cTn>
+                              </p:par>
+                              <p:par>
+                                <p:cTn id="10" presetID="42" presetClass="entr" presetSubtype="0" fill="hold" grpId="0" nodeType="withEffect">
+                                  <p:stCondLst>
+                                    <p:cond delay="0"/>
+                                  </p:stCondLst>
+                                  <p:childTnLst>
+                                    <p:set>
+                                      <p:cBhvr>
+                                        <p:cTn id="11" dur="1" fill="hold">
+                                          <p:stCondLst>
+                                            <p:cond delay="0"/>
+                                          </p:stCondLst>
+                                        </p:cTn>
+                                        <p:tgtEl>
+                                          <p:spTgt spid="19"/>
+                                        </p:tgtEl>
+                                        <p:attrNameLst>
+                                          <p:attrName>style.visibility</p:attrName>
+                                        </p:attrNameLst>
+                                      </p:cBhvr>
+                                      <p:to>
+                                        <p:strVal val="visible"/>
+                                      </p:to>
+                                    </p:set>
+                                    <p:animEffect transition="in" filter="fade">
+                                      <p:cBhvr>
+                                        <p:cTn id="12" dur="1000"/>
+                                        <p:tgtEl>
+                                          <p:spTgt spid="19"/>
+                                        </p:tgtEl>
+                                      </p:cBhvr>
+                                    </p:animEffect>
+                                    <p:anim calcmode="lin" valueType="num">
+                                      <p:cBhvr>
+                                        <p:cTn id="13" dur="1000" fill="hold"/>
+                                        <p:tgtEl>
+                                          <p:spTgt spid="19"/>
+                                        </p:tgtEl>
+                                        <p:attrNameLst>
+                                          <p:attrName>ppt_x</p:attrName>
+                                        </p:attrNameLst>
+                                      </p:cBhvr>
+                                      <p:tavLst>
+                                        <p:tav tm="0">
+                                          <p:val>
+                                            <p:strVal val="#ppt_x"/>
+                                          </p:val>
+                                        </p:tav>
+                                        <p:tav tm="100000">
+                                          <p:val>
+                                            <p:strVal val="#ppt_x"/>
+                                          </p:val>
+                                        </p:tav>
+                                      </p:tavLst>
+                                    </p:anim>
+                                    <p:anim calcmode="lin" valueType="num">
+                                      <p:cBhvr>
+                                        <p:cTn id="14" dur="1000" fill="hold"/>
+                                        <p:tgtEl>
+                                          <p:spTgt spid="19"/>
+                                        </p:tgtEl>
+                                        <p:attrNameLst>
+                                          <p:attrName>ppt_y</p:attrName>
+                                        </p:attrNameLst>
+                                      </p:cBhvr>
+                                      <p:tavLst>
+                                        <p:tav tm="0">
+                                          <p:val>
+                                            <p:strVal val="#ppt_y+.1"/>
+                                          </p:val>
+                                        </p:tav>
+                                        <p:tav tm="100000">
+                                          <p:val>
+                                            <p:strVal val="#ppt_y"/>
+                                          </p:val>
+                                        </p:tav>
+                                      </p:tavLst>
+                                    </p:anim>
+                                  </p:childTnLst>
+                                </p:cTn>
+                              </p:par>
+                            </p:childTnLst>
+                          </p:cTn>
+                        </p:par>
+                      </p:childTnLst>
+                    </p:cTn>
+                  </p:par>
+                  <p:par>
+                    <p:cTn id="15" fill="hold">
+                      <p:stCondLst>
+                        <p:cond delay="indefinite"/>
+                      </p:stCondLst>
+                      <p:childTnLst>
+                        <p:par>
+                          <p:cTn id="16" fill="hold">
+                            <p:stCondLst>
+                              <p:cond delay="0"/>
+                            </p:stCondLst>
+                            <p:childTnLst>
+                              <p:par>
+                                <p:cTn id="17" presetID="42" presetClass="entr" presetSubtype="0" fill="hold" nodeType="clickEffect">
+                                  <p:stCondLst>
+                                    <p:cond delay="0"/>
+                                  </p:stCondLst>
+                                  <p:childTnLst>
+                                    <p:set>
+                                      <p:cBhvr>
+                                        <p:cTn id="18" dur="1" fill="hold">
+                                          <p:stCondLst>
+                                            <p:cond delay="0"/>
+                                          </p:stCondLst>
+                                        </p:cTn>
+                                        <p:tgtEl>
+                                          <p:spTgt spid="9"/>
+                                        </p:tgtEl>
+                                        <p:attrNameLst>
+                                          <p:attrName>style.visibility</p:attrName>
+                                        </p:attrNameLst>
+                                      </p:cBhvr>
+                                      <p:to>
+                                        <p:strVal val="visible"/>
+                                      </p:to>
+                                    </p:set>
+                                    <p:animEffect transition="in" filter="fade">
+                                      <p:cBhvr>
+                                        <p:cTn id="19" dur="1000"/>
+                                        <p:tgtEl>
+                                          <p:spTgt spid="9"/>
+                                        </p:tgtEl>
+                                      </p:cBhvr>
+                                    </p:animEffect>
+                                    <p:anim calcmode="lin" valueType="num">
+                                      <p:cBhvr>
+                                        <p:cTn id="20" dur="1000" fill="hold"/>
+                                        <p:tgtEl>
+                                          <p:spTgt spid="9"/>
+                                        </p:tgtEl>
+                                        <p:attrNameLst>
+                                          <p:attrName>ppt_x</p:attrName>
+                                        </p:attrNameLst>
+                                      </p:cBhvr>
+                                      <p:tavLst>
+                                        <p:tav tm="0">
+                                          <p:val>
+                                            <p:strVal val="#ppt_x"/>
+                                          </p:val>
+                                        </p:tav>
+                                        <p:tav tm="100000">
+                                          <p:val>
+                                            <p:strVal val="#ppt_x"/>
+                                          </p:val>
+                                        </p:tav>
+                                      </p:tavLst>
+                                    </p:anim>
+                                    <p:anim calcmode="lin" valueType="num">
+                                      <p:cBhvr>
+                                        <p:cTn id="21" dur="1000" fill="hold"/>
+                                        <p:tgtEl>
+                                          <p:spTgt spid="9"/>
+                                        </p:tgtEl>
+                                        <p:attrNameLst>
+                                          <p:attrName>ppt_y</p:attrName>
+                                        </p:attrNameLst>
+                                      </p:cBhvr>
+                                      <p:tavLst>
+                                        <p:tav tm="0">
+                                          <p:val>
+                                            <p:strVal val="#ppt_y+.1"/>
+                                          </p:val>
+                                        </p:tav>
+                                        <p:tav tm="100000">
+                                          <p:val>
+                                            <p:strVal val="#ppt_y"/>
+                                          </p:val>
+                                        </p:tav>
+                                      </p:tavLst>
+                                    </p:anim>
+                                  </p:childTnLst>
+                                </p:cTn>
+                              </p:par>
+                              <p:par>
+                                <p:cTn id="22" presetID="42" presetClass="entr" presetSubtype="0" fill="hold" grpId="0" nodeType="withEffect">
+                                  <p:stCondLst>
+                                    <p:cond delay="0"/>
+                                  </p:stCondLst>
+                                  <p:childTnLst>
+                                    <p:set>
+                                      <p:cBhvr>
+                                        <p:cTn id="23" dur="1" fill="hold">
+                                          <p:stCondLst>
+                                            <p:cond delay="0"/>
+                                          </p:stCondLst>
+                                        </p:cTn>
+                                        <p:tgtEl>
+                                          <p:spTgt spid="10"/>
+                                        </p:tgtEl>
+                                        <p:attrNameLst>
+                                          <p:attrName>style.visibility</p:attrName>
+                                        </p:attrNameLst>
+                                      </p:cBhvr>
+                                      <p:to>
+                                        <p:strVal val="visible"/>
+                                      </p:to>
+                                    </p:set>
+                                    <p:animEffect transition="in" filter="fade">
+                                      <p:cBhvr>
+                                        <p:cTn id="24" dur="1000"/>
+                                        <p:tgtEl>
+                                          <p:spTgt spid="10"/>
+                                        </p:tgtEl>
+                                      </p:cBhvr>
+                                    </p:animEffect>
+                                    <p:anim calcmode="lin" valueType="num">
+                                      <p:cBhvr>
+                                        <p:cTn id="25" dur="1000" fill="hold"/>
+                                        <p:tgtEl>
+                                          <p:spTgt spid="10"/>
+                                        </p:tgtEl>
+                                        <p:attrNameLst>
+                                          <p:attrName>ppt_x</p:attrName>
+                                        </p:attrNameLst>
+                                      </p:cBhvr>
+                                      <p:tavLst>
+                                        <p:tav tm="0">
+                                          <p:val>
+                                            <p:strVal val="#ppt_x"/>
+                                          </p:val>
+                                        </p:tav>
+                                        <p:tav tm="100000">
+                                          <p:val>
+                                            <p:strVal val="#ppt_x"/>
+                                          </p:val>
+                                        </p:tav>
+                                      </p:tavLst>
+                                    </p:anim>
+                                    <p:anim calcmode="lin" valueType="num">
+                                      <p:cBhvr>
+                                        <p:cTn id="26" dur="1000" fill="hold"/>
+                                        <p:tgtEl>
+                                          <p:spTgt spid="10"/>
+                                        </p:tgtEl>
+                                        <p:attrNameLst>
+                                          <p:attrName>ppt_y</p:attrName>
+                                        </p:attrNameLst>
+                                      </p:cBhvr>
+                                      <p:tavLst>
+                                        <p:tav tm="0">
+                                          <p:val>
+                                            <p:strVal val="#ppt_y+.1"/>
+                                          </p:val>
+                                        </p:tav>
+                                        <p:tav tm="100000">
+                                          <p:val>
+                                            <p:strVal val="#ppt_y"/>
+                                          </p:val>
+                                        </p:tav>
+                                      </p:tavLst>
+                                    </p:anim>
+                                  </p:childTnLst>
+                                </p:cTn>
+                              </p:par>
+                            </p:childTnLst>
+                          </p:cTn>
+                        </p:par>
+                      </p:childTnLst>
+                    </p:cTn>
+                  </p:par>
+                  <p:par>
+                    <p:cTn id="27" fill="hold">
+                      <p:stCondLst>
+                        <p:cond delay="indefinite"/>
+                      </p:stCondLst>
+                      <p:childTnLst>
+                        <p:par>
+                          <p:cTn id="28" fill="hold">
+                            <p:stCondLst>
+                              <p:cond delay="0"/>
+                            </p:stCondLst>
+                            <p:childTnLst>
+                              <p:par>
+                                <p:cTn id="29" presetID="42" presetClass="entr" presetSubtype="0" fill="hold" nodeType="clickEffect">
+                                  <p:stCondLst>
+                                    <p:cond delay="0"/>
+                                  </p:stCondLst>
+                                  <p:childTnLst>
+                                    <p:set>
+                                      <p:cBhvr>
+                                        <p:cTn id="30" dur="1" fill="hold">
+                                          <p:stCondLst>
+                                            <p:cond delay="0"/>
+                                          </p:stCondLst>
+                                        </p:cTn>
+                                        <p:tgtEl>
+                                          <p:spTgt spid="12"/>
+                                        </p:tgtEl>
+                                        <p:attrNameLst>
+                                          <p:attrName>style.visibility</p:attrName>
+                                        </p:attrNameLst>
+                                      </p:cBhvr>
+                                      <p:to>
+                                        <p:strVal val="visible"/>
+                                      </p:to>
+                                    </p:set>
+                                    <p:animEffect transition="in" filter="fade">
+                                      <p:cBhvr>
+                                        <p:cTn id="31" dur="1000"/>
+                                        <p:tgtEl>
+                                          <p:spTgt spid="12"/>
+                                        </p:tgtEl>
+                                      </p:cBhvr>
+                                    </p:animEffect>
+                                    <p:anim calcmode="lin" valueType="num">
+                                      <p:cBhvr>
+                                        <p:cTn id="32" dur="1000" fill="hold"/>
+                                        <p:tgtEl>
+                                          <p:spTgt spid="12"/>
+                                        </p:tgtEl>
+                                        <p:attrNameLst>
+                                          <p:attrName>ppt_x</p:attrName>
+                                        </p:attrNameLst>
+                                      </p:cBhvr>
+                                      <p:tavLst>
+                                        <p:tav tm="0">
+                                          <p:val>
+                                            <p:strVal val="#ppt_x"/>
+                                          </p:val>
+                                        </p:tav>
+                                        <p:tav tm="100000">
+                                          <p:val>
+                                            <p:strVal val="#ppt_x"/>
+                                          </p:val>
+                                        </p:tav>
+                                      </p:tavLst>
+                                    </p:anim>
+                                    <p:anim calcmode="lin" valueType="num">
+                                      <p:cBhvr>
+                                        <p:cTn id="33" dur="1000" fill="hold"/>
+                                        <p:tgtEl>
+                                          <p:spTgt spid="12"/>
+                                        </p:tgtEl>
+                                        <p:attrNameLst>
+                                          <p:attrName>ppt_y</p:attrName>
+                                        </p:attrNameLst>
+                                      </p:cBhvr>
+                                      <p:tavLst>
+                                        <p:tav tm="0">
+                                          <p:val>
+                                            <p:strVal val="#ppt_y+.1"/>
+                                          </p:val>
+                                        </p:tav>
+                                        <p:tav tm="100000">
+                                          <p:val>
+                                            <p:strVal val="#ppt_y"/>
+                                          </p:val>
+                                        </p:tav>
+                                      </p:tavLst>
+                                    </p:anim>
+                                  </p:childTnLst>
+                                </p:cTn>
+                              </p:par>
+                              <p:par>
+                                <p:cTn id="34" presetID="42" presetClass="entr" presetSubtype="0" fill="hold" grpId="0" nodeType="withEffect">
+                                  <p:stCondLst>
+                                    <p:cond delay="0"/>
+                                  </p:stCondLst>
+                                  <p:childTnLst>
+                                    <p:set>
+                                      <p:cBhvr>
+                                        <p:cTn id="35" dur="1" fill="hold">
+                                          <p:stCondLst>
+                                            <p:cond delay="0"/>
+                                          </p:stCondLst>
+                                        </p:cTn>
+                                        <p:tgtEl>
+                                          <p:spTgt spid="13"/>
+                                        </p:tgtEl>
+                                        <p:attrNameLst>
+                                          <p:attrName>style.visibility</p:attrName>
+                                        </p:attrNameLst>
+                                      </p:cBhvr>
+                                      <p:to>
+                                        <p:strVal val="visible"/>
+                                      </p:to>
+                                    </p:set>
+                                    <p:animEffect transition="in" filter="fade">
+                                      <p:cBhvr>
+                                        <p:cTn id="36" dur="1000"/>
+                                        <p:tgtEl>
+                                          <p:spTgt spid="13"/>
+                                        </p:tgtEl>
+                                      </p:cBhvr>
+                                    </p:animEffect>
+                                    <p:anim calcmode="lin" valueType="num">
+                                      <p:cBhvr>
+                                        <p:cTn id="37" dur="1000" fill="hold"/>
+                                        <p:tgtEl>
+                                          <p:spTgt spid="13"/>
+                                        </p:tgtEl>
+                                        <p:attrNameLst>
+                                          <p:attrName>ppt_x</p:attrName>
+                                        </p:attrNameLst>
+                                      </p:cBhvr>
+                                      <p:tavLst>
+                                        <p:tav tm="0">
+                                          <p:val>
+                                            <p:strVal val="#ppt_x"/>
+                                          </p:val>
+                                        </p:tav>
+                                        <p:tav tm="100000">
+                                          <p:val>
+                                            <p:strVal val="#ppt_x"/>
+                                          </p:val>
+                                        </p:tav>
+                                      </p:tavLst>
+                                    </p:anim>
+                                    <p:anim calcmode="lin" valueType="num">
+                                      <p:cBhvr>
+                                        <p:cTn id="38" dur="1000" fill="hold"/>
+                                        <p:tgtEl>
+                                          <p:spTgt spid="13"/>
+                                        </p:tgtEl>
+                                        <p:attrNameLst>
+                                          <p:attrName>ppt_y</p:attrName>
+                                        </p:attrNameLst>
+                                      </p:cBhvr>
+                                      <p:tavLst>
+                                        <p:tav tm="0">
+                                          <p:val>
+                                            <p:strVal val="#ppt_y+.1"/>
+                                          </p:val>
+                                        </p:tav>
+                                        <p:tav tm="100000">
+                                          <p:val>
+                                            <p:strVal val="#ppt_y"/>
+                                          </p:val>
+                                        </p:tav>
+                                      </p:tavLst>
+                                    </p:anim>
+                                  </p:childTnLst>
+                                </p:cTn>
+                              </p:par>
+                            </p:childTnLst>
+                          </p:cTn>
+                        </p:par>
+                      </p:childTnLst>
+                    </p:cTn>
+                  </p:par>
+                  <p:par>
+                    <p:cTn id="39" fill="hold">
+                      <p:stCondLst>
+                        <p:cond delay="indefinite"/>
+                      </p:stCondLst>
+                      <p:childTnLst>
+                        <p:par>
+                          <p:cTn id="40" fill="hold">
+                            <p:stCondLst>
+                              <p:cond delay="0"/>
+                            </p:stCondLst>
+                            <p:childTnLst>
+                              <p:par>
+                                <p:cTn id="41" presetID="42" presetClass="entr" presetSubtype="0" fill="hold" nodeType="clickEffect">
+                                  <p:stCondLst>
+                                    <p:cond delay="0"/>
+                                  </p:stCondLst>
+                                  <p:childTnLst>
+                                    <p:set>
+                                      <p:cBhvr>
+                                        <p:cTn id="42" dur="1" fill="hold">
+                                          <p:stCondLst>
+                                            <p:cond delay="0"/>
+                                          </p:stCondLst>
+                                        </p:cTn>
+                                        <p:tgtEl>
+                                          <p:spTgt spid="15"/>
+                                        </p:tgtEl>
+                                        <p:attrNameLst>
+                                          <p:attrName>style.visibility</p:attrName>
+                                        </p:attrNameLst>
+                                      </p:cBhvr>
+                                      <p:to>
+                                        <p:strVal val="visible"/>
+                                      </p:to>
+                                    </p:set>
+                                    <p:animEffect transition="in" filter="fade">
+                                      <p:cBhvr>
+                                        <p:cTn id="43" dur="1000"/>
+                                        <p:tgtEl>
+                                          <p:spTgt spid="15"/>
+                                        </p:tgtEl>
+                                      </p:cBhvr>
+                                    </p:animEffect>
+                                    <p:anim calcmode="lin" valueType="num">
+                                      <p:cBhvr>
+                                        <p:cTn id="44" dur="1000" fill="hold"/>
+                                        <p:tgtEl>
+                                          <p:spTgt spid="15"/>
+                                        </p:tgtEl>
+                                        <p:attrNameLst>
+                                          <p:attrName>ppt_x</p:attrName>
+                                        </p:attrNameLst>
+                                      </p:cBhvr>
+                                      <p:tavLst>
+                                        <p:tav tm="0">
+                                          <p:val>
+                                            <p:strVal val="#ppt_x"/>
+                                          </p:val>
+                                        </p:tav>
+                                        <p:tav tm="100000">
+                                          <p:val>
+                                            <p:strVal val="#ppt_x"/>
+                                          </p:val>
+                                        </p:tav>
+                                      </p:tavLst>
+                                    </p:anim>
+                                    <p:anim calcmode="lin" valueType="num">
+                                      <p:cBhvr>
+                                        <p:cTn id="45" dur="1000" fill="hold"/>
+                                        <p:tgtEl>
+                                          <p:spTgt spid="15"/>
+                                        </p:tgtEl>
+                                        <p:attrNameLst>
+                                          <p:attrName>ppt_y</p:attrName>
+                                        </p:attrNameLst>
+                                      </p:cBhvr>
+                                      <p:tavLst>
+                                        <p:tav tm="0">
+                                          <p:val>
+                                            <p:strVal val="#ppt_y+.1"/>
+                                          </p:val>
+                                        </p:tav>
+                                        <p:tav tm="100000">
+                                          <p:val>
+                                            <p:strVal val="#ppt_y"/>
+                                          </p:val>
+                                        </p:tav>
+                                      </p:tavLst>
+                                    </p:anim>
+                                  </p:childTnLst>
+                                </p:cTn>
+                              </p:par>
+                              <p:par>
+                                <p:cTn id="46" presetID="42" presetClass="entr" presetSubtype="0" fill="hold" grpId="0" nodeType="withEffect">
+                                  <p:stCondLst>
+                                    <p:cond delay="0"/>
+                                  </p:stCondLst>
+                                  <p:childTnLst>
+                                    <p:set>
+                                      <p:cBhvr>
+                                        <p:cTn id="47" dur="1" fill="hold">
+                                          <p:stCondLst>
+                                            <p:cond delay="0"/>
+                                          </p:stCondLst>
+                                        </p:cTn>
+                                        <p:tgtEl>
+                                          <p:spTgt spid="18"/>
+                                        </p:tgtEl>
+                                        <p:attrNameLst>
+                                          <p:attrName>style.visibility</p:attrName>
+                                        </p:attrNameLst>
+                                      </p:cBhvr>
+                                      <p:to>
+                                        <p:strVal val="visible"/>
+                                      </p:to>
+                                    </p:set>
+                                    <p:animEffect transition="in" filter="fade">
+                                      <p:cBhvr>
+                                        <p:cTn id="48" dur="1000"/>
+                                        <p:tgtEl>
+                                          <p:spTgt spid="18"/>
+                                        </p:tgtEl>
+                                      </p:cBhvr>
+                                    </p:animEffect>
+                                    <p:anim calcmode="lin" valueType="num">
+                                      <p:cBhvr>
+                                        <p:cTn id="49" dur="1000" fill="hold"/>
+                                        <p:tgtEl>
+                                          <p:spTgt spid="18"/>
+                                        </p:tgtEl>
+                                        <p:attrNameLst>
+                                          <p:attrName>ppt_x</p:attrName>
+                                        </p:attrNameLst>
+                                      </p:cBhvr>
+                                      <p:tavLst>
+                                        <p:tav tm="0">
+                                          <p:val>
+                                            <p:strVal val="#ppt_x"/>
+                                          </p:val>
+                                        </p:tav>
+                                        <p:tav tm="100000">
+                                          <p:val>
+                                            <p:strVal val="#ppt_x"/>
+                                          </p:val>
+                                        </p:tav>
+                                      </p:tavLst>
+                                    </p:anim>
+                                    <p:anim calcmode="lin" valueType="num">
+                                      <p:cBhvr>
+                                        <p:cTn id="50" dur="1000" fill="hold"/>
+                                        <p:tgtEl>
+                                          <p:spTgt spid="18"/>
+                                        </p:tgtEl>
+                                        <p:attrNameLst>
+                                          <p:attrName>ppt_y</p:attrName>
+                                        </p:attrNameLst>
+                                      </p:cBhvr>
+                                      <p:tavLst>
+                                        <p:tav tm="0">
+                                          <p:val>
+                                            <p:strVal val="#ppt_y+.1"/>
+                                          </p:val>
+                                        </p:tav>
+                                        <p:tav tm="100000">
+                                          <p:val>
+                                            <p:strVal val="#ppt_y"/>
+                                          </p:val>
+                                        </p:tav>
+                                      </p:tavLst>
+                                    </p:anim>
+                                  </p:childTnLst>
+                                </p:cTn>
+                              </p:par>
+                            </p:childTnLst>
+                          </p:cTn>
+                        </p:par>
+                      </p:childTnLst>
+                    </p:cTn>
+                  </p:par>
+                  <p:par>
+                    <p:cTn id="51" fill="hold">
+                      <p:stCondLst>
+                        <p:cond delay="indefinite"/>
+                      </p:stCondLst>
+                      <p:childTnLst>
+                        <p:par>
+                          <p:cTn id="52" fill="hold">
+                            <p:stCondLst>
+                              <p:cond delay="0"/>
+                            </p:stCondLst>
+                            <p:childTnLst>
+                              <p:par>
+                                <p:cTn id="53" presetID="42" presetClass="entr" presetSubtype="0" fill="hold" nodeType="clickEffect">
+                                  <p:stCondLst>
+                                    <p:cond delay="0"/>
+                                  </p:stCondLst>
+                                  <p:childTnLst>
+                                    <p:set>
+                                      <p:cBhvr>
+                                        <p:cTn id="54" dur="1" fill="hold">
+                                          <p:stCondLst>
+                                            <p:cond delay="0"/>
+                                          </p:stCondLst>
+                                        </p:cTn>
+                                        <p:tgtEl>
+                                          <p:spTgt spid="21"/>
+                                        </p:tgtEl>
+                                        <p:attrNameLst>
+                                          <p:attrName>style.visibility</p:attrName>
+                                        </p:attrNameLst>
+                                      </p:cBhvr>
+                                      <p:to>
+                                        <p:strVal val="visible"/>
+                                      </p:to>
+                                    </p:set>
+                                    <p:animEffect transition="in" filter="fade">
+                                      <p:cBhvr>
+                                        <p:cTn id="55" dur="1000"/>
+                                        <p:tgtEl>
+                                          <p:spTgt spid="21"/>
+                                        </p:tgtEl>
+                                      </p:cBhvr>
+                                    </p:animEffect>
+                                    <p:anim calcmode="lin" valueType="num">
+                                      <p:cBhvr>
+                                        <p:cTn id="56" dur="1000" fill="hold"/>
+                                        <p:tgtEl>
+                                          <p:spTgt spid="21"/>
+                                        </p:tgtEl>
+                                        <p:attrNameLst>
+                                          <p:attrName>ppt_x</p:attrName>
+                                        </p:attrNameLst>
+                                      </p:cBhvr>
+                                      <p:tavLst>
+                                        <p:tav tm="0">
+                                          <p:val>
+                                            <p:strVal val="#ppt_x"/>
+                                          </p:val>
+                                        </p:tav>
+                                        <p:tav tm="100000">
+                                          <p:val>
+                                            <p:strVal val="#ppt_x"/>
+                                          </p:val>
+                                        </p:tav>
+                                      </p:tavLst>
+                                    </p:anim>
+                                    <p:anim calcmode="lin" valueType="num">
+                                      <p:cBhvr>
+                                        <p:cTn id="57" dur="1000" fill="hold"/>
+                                        <p:tgtEl>
+                                          <p:spTgt spid="21"/>
+                                        </p:tgtEl>
+                                        <p:attrNameLst>
+                                          <p:attrName>ppt_y</p:attrName>
+                                        </p:attrNameLst>
+                                      </p:cBhvr>
+                                      <p:tavLst>
+                                        <p:tav tm="0">
+                                          <p:val>
+                                            <p:strVal val="#ppt_y+.1"/>
+                                          </p:val>
+                                        </p:tav>
+                                        <p:tav tm="100000">
+                                          <p:val>
+                                            <p:strVal val="#ppt_y"/>
+                                          </p:val>
+                                        </p:tav>
+                                      </p:tavLst>
+                                    </p:anim>
+                                  </p:childTnLst>
+                                </p:cTn>
+                              </p:par>
+                              <p:par>
+                                <p:cTn id="58" presetID="42" presetClass="entr" presetSubtype="0" fill="hold" grpId="0" nodeType="withEffect">
+                                  <p:stCondLst>
+                                    <p:cond delay="0"/>
+                                  </p:stCondLst>
+                                  <p:childTnLst>
+                                    <p:set>
+                                      <p:cBhvr>
+                                        <p:cTn id="59" dur="1" fill="hold">
+                                          <p:stCondLst>
+                                            <p:cond delay="0"/>
+                                          </p:stCondLst>
+                                        </p:cTn>
+                                        <p:tgtEl>
+                                          <p:spTgt spid="22"/>
+                                        </p:tgtEl>
+                                        <p:attrNameLst>
+                                          <p:attrName>style.visibility</p:attrName>
+                                        </p:attrNameLst>
+                                      </p:cBhvr>
+                                      <p:to>
+                                        <p:strVal val="visible"/>
+                                      </p:to>
+                                    </p:set>
+                                    <p:animEffect transition="in" filter="fade">
+                                      <p:cBhvr>
+                                        <p:cTn id="60" dur="1000"/>
+                                        <p:tgtEl>
+                                          <p:spTgt spid="22"/>
+                                        </p:tgtEl>
+                                      </p:cBhvr>
+                                    </p:animEffect>
+                                    <p:anim calcmode="lin" valueType="num">
+                                      <p:cBhvr>
+                                        <p:cTn id="61" dur="1000" fill="hold"/>
+                                        <p:tgtEl>
+                                          <p:spTgt spid="22"/>
+                                        </p:tgtEl>
+                                        <p:attrNameLst>
+                                          <p:attrName>ppt_x</p:attrName>
+                                        </p:attrNameLst>
+                                      </p:cBhvr>
+                                      <p:tavLst>
+                                        <p:tav tm="0">
+                                          <p:val>
+                                            <p:strVal val="#ppt_x"/>
+                                          </p:val>
+                                        </p:tav>
+                                        <p:tav tm="100000">
+                                          <p:val>
+                                            <p:strVal val="#ppt_x"/>
+                                          </p:val>
+                                        </p:tav>
+                                      </p:tavLst>
+                                    </p:anim>
+                                    <p:anim calcmode="lin" valueType="num">
+                                      <p:cBhvr>
+                                        <p:cTn id="62" dur="1000" fill="hold"/>
+                                        <p:tgtEl>
+                                          <p:spTgt spid="22"/>
+                                        </p:tgtEl>
+                                        <p:attrNameLst>
+                                          <p:attrName>ppt_y</p:attrName>
+                                        </p:attrNameLst>
+                                      </p:cBhvr>
+                                      <p:tavLst>
+                                        <p:tav tm="0">
+                                          <p:val>
+                                            <p:strVal val="#ppt_y+.1"/>
+                                          </p:val>
+                                        </p:tav>
+                                        <p:tav tm="100000">
+                                          <p:val>
+                                            <p:strVal val="#ppt_y"/>
+                                          </p:val>
+                                        </p:tav>
+                                      </p:tavLst>
+                                    </p:anim>
+                                  </p:childTnLst>
+                                </p:cTn>
+                              </p:par>
+                            </p:childTnLst>
+                          </p:cTn>
+                        </p:par>
+                      </p:childTnLst>
+                    </p:cTn>
+                  </p:par>
+                </p:childTnLst>
+              </p:cTn>
+              <p:prevCondLst>
+                <p:cond evt="onPrev" delay="0">
+                  <p:tgtEl>
+                    <p:sldTgt/>
+                  </p:tgtEl>
+                </p:cond>
+              </p:prevCondLst>
+              <p:nextCondLst>
+                <p:cond evt="onNext" delay="0">
+                  <p:tgtEl>
+                    <p:sldTgt/>
+                  </p:tgtEl>
+                </p:cond>
+              </p:nextCondLst>
+            </p:seq>
+          </p:childTnLst>
+        </p:cTn>
+      </p:par>
+    </p:tnLst>
+    <p:bldLst>
+      <p:bldP spid="10" grpId="0"/>
+      <p:bldP spid="13" grpId="0"/>
+      <p:bldP spid="18" grpId="0"/>
+      <p:bldP spid="19" grpId="0"/>
+      <p:bldP spid="22" grpId="0"/>
+    </p:bldLst>
+  </p:timing>
 </p:sld>
 </file>
 

</xml_diff>